<commit_message>
dubbo src study3 extension close
</commit_message>
<xml_diff>
--- a/04.dubbo_demo/document/dubbo源码分析3-扩展点.pptx
+++ b/04.dubbo_demo/document/dubbo源码分析3-扩展点.pptx
@@ -5,18 +5,20 @@
     <p:sldMasterId id="2147483648" r:id="rId1"/>
   </p:sldMasterIdLst>
   <p:notesMasterIdLst>
-    <p:notesMasterId r:id="rId8"/>
+    <p:notesMasterId r:id="rId10"/>
   </p:notesMasterIdLst>
   <p:handoutMasterIdLst>
-    <p:handoutMasterId r:id="rId9"/>
+    <p:handoutMasterId r:id="rId11"/>
   </p:handoutMasterIdLst>
   <p:sldIdLst>
     <p:sldId id="258" r:id="rId2"/>
     <p:sldId id="267" r:id="rId3"/>
     <p:sldId id="270" r:id="rId4"/>
     <p:sldId id="268" r:id="rId5"/>
-    <p:sldId id="269" r:id="rId6"/>
-    <p:sldId id="271" r:id="rId7"/>
+    <p:sldId id="272" r:id="rId6"/>
+    <p:sldId id="273" r:id="rId7"/>
+    <p:sldId id="274" r:id="rId8"/>
+    <p:sldId id="269" r:id="rId9"/>
   </p:sldIdLst>
   <p:sldSz cx="9144000" cy="6858000" type="screen4x3"/>
   <p:notesSz cx="6858000" cy="9144000"/>
@@ -200,7 +202,7 @@
           <a:p>
             <a:fld id="{A24470EC-9BB2-47C0-BC15-E1BE469E1A44}" type="datetimeFigureOut">
               <a:rPr lang="zh-CN" altLang="en-US" smtClean="0"/>
-              <a:t>2016/9/11</a:t>
+              <a:t>2016/9/17</a:t>
             </a:fld>
             <a:endParaRPr lang="zh-CN" altLang="en-US"/>
           </a:p>
@@ -365,7 +367,7 @@
           <a:p>
             <a:fld id="{CBBF4566-D28E-4F21-9CA6-C92C78680512}" type="datetimeFigureOut">
               <a:rPr lang="zh-CN" altLang="en-US" smtClean="0"/>
-              <a:t>2016/9/11</a:t>
+              <a:t>2016/9/17</a:t>
             </a:fld>
             <a:endParaRPr lang="zh-CN" altLang="en-US"/>
           </a:p>
@@ -818,7 +820,7 @@
           <a:p>
             <a:fld id="{FE514A0D-6246-45A0-AFCD-05CB06E3D75A}" type="datetime1">
               <a:rPr lang="zh-CN" altLang="en-US" smtClean="0"/>
-              <a:t>2016/9/11</a:t>
+              <a:t>2016/9/17</a:t>
             </a:fld>
             <a:endParaRPr lang="zh-CN" altLang="en-US" dirty="0"/>
           </a:p>
@@ -983,7 +985,7 @@
           <a:p>
             <a:fld id="{AE5463FA-5733-4E22-A176-CA0F8E59A78F}" type="datetime1">
               <a:rPr lang="zh-CN" altLang="en-US" smtClean="0"/>
-              <a:t>2016/9/11</a:t>
+              <a:t>2016/9/17</a:t>
             </a:fld>
             <a:endParaRPr lang="zh-CN" altLang="en-US"/>
           </a:p>
@@ -1158,7 +1160,7 @@
           <a:p>
             <a:fld id="{AB202E1E-E171-4D05-9995-782F74FA70A7}" type="datetime1">
               <a:rPr lang="zh-CN" altLang="en-US" smtClean="0"/>
-              <a:t>2016/9/11</a:t>
+              <a:t>2016/9/17</a:t>
             </a:fld>
             <a:endParaRPr lang="zh-CN" altLang="en-US"/>
           </a:p>
@@ -1323,7 +1325,7 @@
           <a:p>
             <a:fld id="{B34AA640-87DE-403B-AC78-F6FEE0B57B5D}" type="datetime1">
               <a:rPr lang="zh-CN" altLang="en-US" smtClean="0"/>
-              <a:t>2016/9/11</a:t>
+              <a:t>2016/9/17</a:t>
             </a:fld>
             <a:endParaRPr lang="zh-CN" altLang="en-US"/>
           </a:p>
@@ -1564,7 +1566,7 @@
           <a:p>
             <a:fld id="{A0663606-6224-48AC-A9C3-01536FF5A8D3}" type="datetime1">
               <a:rPr lang="zh-CN" altLang="en-US" smtClean="0"/>
-              <a:t>2016/9/11</a:t>
+              <a:t>2016/9/17</a:t>
             </a:fld>
             <a:endParaRPr lang="zh-CN" altLang="en-US"/>
           </a:p>
@@ -1847,7 +1849,7 @@
           <a:p>
             <a:fld id="{BCFAA94D-CC7D-4797-A37E-F6E45888FFD3}" type="datetime1">
               <a:rPr lang="zh-CN" altLang="en-US" smtClean="0"/>
-              <a:t>2016/9/11</a:t>
+              <a:t>2016/9/17</a:t>
             </a:fld>
             <a:endParaRPr lang="zh-CN" altLang="en-US"/>
           </a:p>
@@ -2264,7 +2266,7 @@
           <a:p>
             <a:fld id="{CB3D4EC1-D5F4-4EA7-BEE4-003887811976}" type="datetime1">
               <a:rPr lang="zh-CN" altLang="en-US" smtClean="0"/>
-              <a:t>2016/9/11</a:t>
+              <a:t>2016/9/17</a:t>
             </a:fld>
             <a:endParaRPr lang="zh-CN" altLang="en-US"/>
           </a:p>
@@ -2377,7 +2379,7 @@
           <a:p>
             <a:fld id="{A3F3B0D5-BEE7-46BD-8C3C-1F24935BD2BA}" type="datetime1">
               <a:rPr lang="zh-CN" altLang="en-US" smtClean="0"/>
-              <a:t>2016/9/11</a:t>
+              <a:t>2016/9/17</a:t>
             </a:fld>
             <a:endParaRPr lang="zh-CN" altLang="en-US"/>
           </a:p>
@@ -2467,7 +2469,7 @@
           <a:p>
             <a:fld id="{BAA94D51-A23F-4C7E-ACB9-F69CEC11A8FE}" type="datetime1">
               <a:rPr lang="zh-CN" altLang="en-US" smtClean="0"/>
-              <a:t>2016/9/11</a:t>
+              <a:t>2016/9/17</a:t>
             </a:fld>
             <a:endParaRPr lang="zh-CN" altLang="en-US"/>
           </a:p>
@@ -2739,7 +2741,7 @@
           <a:p>
             <a:fld id="{2F94AAA0-004A-44A7-9D1C-22721FA89EC0}" type="datetime1">
               <a:rPr lang="zh-CN" altLang="en-US" smtClean="0"/>
-              <a:t>2016/9/11</a:t>
+              <a:t>2016/9/17</a:t>
             </a:fld>
             <a:endParaRPr lang="zh-CN" altLang="en-US"/>
           </a:p>
@@ -2987,7 +2989,7 @@
           <a:p>
             <a:fld id="{F570CB73-500B-46CB-B603-E25A55C666EC}" type="datetime1">
               <a:rPr lang="zh-CN" altLang="en-US" smtClean="0"/>
-              <a:t>2016/9/11</a:t>
+              <a:t>2016/9/17</a:t>
             </a:fld>
             <a:endParaRPr lang="zh-CN" altLang="en-US"/>
           </a:p>
@@ -3209,7 +3211,7 @@
           <a:p>
             <a:fld id="{E708D0EF-A89D-41AA-A2B5-7C45C89333AE}" type="datetime1">
               <a:rPr lang="zh-CN" altLang="en-US" smtClean="0"/>
-              <a:t>2016/9/11</a:t>
+              <a:t>2016/9/17</a:t>
             </a:fld>
             <a:endParaRPr lang="zh-CN" altLang="en-US"/>
           </a:p>
@@ -3679,7 +3681,7 @@
           <a:p>
             <a:fld id="{DC0212C2-3CC8-4688-A0F8-3B0C9C548618}" type="datetime1">
               <a:rPr lang="zh-CN" altLang="en-US" smtClean="0"/>
-              <a:t>2016/9/11</a:t>
+              <a:t>2016/9/17</a:t>
             </a:fld>
             <a:endParaRPr lang="zh-CN" altLang="en-US" dirty="0"/>
           </a:p>
@@ -4137,7 +4139,7 @@
           <a:p>
             <a:fld id="{B34AA640-87DE-403B-AC78-F6FEE0B57B5D}" type="datetime1">
               <a:rPr lang="zh-CN" altLang="en-US" smtClean="0"/>
-              <a:t>2016/9/11</a:t>
+              <a:t>2016/9/17</a:t>
             </a:fld>
             <a:endParaRPr lang="zh-CN" altLang="en-US"/>
           </a:p>
@@ -4236,11 +4238,15 @@
           <a:p>
             <a:r>
               <a:rPr lang="zh-CN" altLang="en-US" dirty="0" smtClean="0"/>
-              <a:t>可以从</a:t>
-            </a:r>
-            <a:r>
-              <a:rPr lang="en-US" altLang="zh-CN" dirty="0" err="1" smtClean="0"/>
-              <a:t>extensionloader</a:t>
+              <a:t>可以</a:t>
+            </a:r>
+            <a:r>
+              <a:rPr lang="zh-CN" altLang="en-US" dirty="0" smtClean="0"/>
+              <a:t>从</a:t>
+            </a:r>
+            <a:r>
+              <a:rPr lang="en-US" altLang="zh-CN" dirty="0" err="1"/>
+              <a:t>ExtensionLoader</a:t>
             </a:r>
             <a:r>
               <a:rPr lang="zh-CN" altLang="en-US" dirty="0" smtClean="0"/>
@@ -4275,7 +4281,30 @@
             </a:r>
             <a:r>
               <a:rPr lang="zh-CN" altLang="en-US" dirty="0" smtClean="0"/>
-              <a:t>项目</a:t>
+              <a:t>项</a:t>
+            </a:r>
+            <a:r>
+              <a:rPr lang="zh-CN" altLang="en-US" dirty="0" smtClean="0"/>
+              <a:t>目</a:t>
+            </a:r>
+            <a:endParaRPr lang="en-US" altLang="zh-CN" dirty="0" smtClean="0"/>
+          </a:p>
+          <a:p>
+            <a:r>
+              <a:rPr lang="zh-CN" altLang="en-US" dirty="0"/>
+              <a:t>也可</a:t>
+            </a:r>
+            <a:r>
+              <a:rPr lang="zh-CN" altLang="en-US" dirty="0" smtClean="0"/>
+              <a:t>以直接分析</a:t>
+            </a:r>
+            <a:r>
+              <a:rPr lang="en-US" altLang="zh-CN" dirty="0" err="1" smtClean="0"/>
+              <a:t>ExtensionLoader</a:t>
+            </a:r>
+            <a:r>
+              <a:rPr lang="zh-CN" altLang="en-US" dirty="0" smtClean="0"/>
+              <a:t>代码</a:t>
             </a:r>
             <a:endParaRPr lang="zh-CN" altLang="en-US" dirty="0"/>
           </a:p>
@@ -4298,7 +4327,7 @@
           <a:p>
             <a:fld id="{B34AA640-87DE-403B-AC78-F6FEE0B57B5D}" type="datetime1">
               <a:rPr lang="zh-CN" altLang="en-US" smtClean="0"/>
-              <a:t>2016/9/11</a:t>
+              <a:t>2016/9/17</a:t>
             </a:fld>
             <a:endParaRPr lang="zh-CN" altLang="en-US"/>
           </a:p>
@@ -4374,7 +4403,11 @@
           <a:p>
             <a:r>
               <a:rPr lang="zh-CN" altLang="en-US" dirty="0" smtClean="0"/>
-              <a:t>两类与两个动作</a:t>
+              <a:t>两</a:t>
+            </a:r>
+            <a:r>
+              <a:rPr lang="zh-CN" altLang="en-US" dirty="0" smtClean="0"/>
+              <a:t>个动作</a:t>
             </a:r>
             <a:endParaRPr lang="zh-CN" altLang="en-US" dirty="0"/>
           </a:p>
@@ -4397,7 +4430,11 @@
           <a:p>
             <a:r>
               <a:rPr lang="zh-CN" altLang="en-US" dirty="0" smtClean="0"/>
-              <a:t>两类</a:t>
+              <a:t>两</a:t>
+            </a:r>
+            <a:r>
+              <a:rPr lang="zh-CN" altLang="en-US" dirty="0" smtClean="0"/>
+              <a:t>个动作 对外暴露</a:t>
             </a:r>
             <a:endParaRPr lang="en-US" altLang="zh-CN" dirty="0" smtClean="0"/>
           </a:p>
@@ -4405,58 +4442,13 @@
             <a:pPr lvl="1"/>
             <a:r>
               <a:rPr lang="en-US" altLang="zh-CN" dirty="0" err="1" smtClean="0"/>
-              <a:t>ExtensionFactory</a:t>
+              <a:t>getExtension</a:t>
             </a:r>
             <a:r>
               <a:rPr lang="en-US" altLang="zh-CN" dirty="0" smtClean="0"/>
               <a:t> </a:t>
             </a:r>
-          </a:p>
-          <a:p>
-            <a:pPr lvl="1"/>
-            <a:r>
-              <a:rPr lang="zh-CN" altLang="en-US" dirty="0" smtClean="0"/>
-              <a:t>非</a:t>
-            </a:r>
-            <a:r>
-              <a:rPr lang="en-US" altLang="zh-CN" dirty="0" err="1" smtClean="0"/>
-              <a:t>ExtensionFactory</a:t>
-            </a:r>
-            <a:r>
-              <a:rPr lang="en-US" altLang="zh-CN" dirty="0" smtClean="0"/>
-              <a:t> </a:t>
-            </a:r>
-            <a:r>
-              <a:rPr lang="zh-CN" altLang="en-US" dirty="0" smtClean="0"/>
-              <a:t>比如</a:t>
-            </a:r>
-            <a:r>
-              <a:rPr lang="en-US" altLang="zh-CN" dirty="0" err="1" smtClean="0"/>
-              <a:t>ProxyFactory</a:t>
-            </a:r>
             <a:endParaRPr lang="en-US" altLang="zh-CN" dirty="0" smtClean="0"/>
-          </a:p>
-          <a:p>
-            <a:r>
-              <a:rPr lang="zh-CN" altLang="en-US" dirty="0"/>
-              <a:t>两</a:t>
-            </a:r>
-            <a:r>
-              <a:rPr lang="zh-CN" altLang="en-US" dirty="0" smtClean="0"/>
-              <a:t>个动作 对外暴露</a:t>
-            </a:r>
-            <a:endParaRPr lang="en-US" altLang="zh-CN" dirty="0" smtClean="0"/>
-          </a:p>
-          <a:p>
-            <a:pPr lvl="1"/>
-            <a:r>
-              <a:rPr lang="en-US" altLang="zh-CN" dirty="0" err="1" smtClean="0"/>
-              <a:t>getExtensionLoader</a:t>
-            </a:r>
-            <a:r>
-              <a:rPr lang="en-US" altLang="zh-CN" dirty="0" smtClean="0"/>
-              <a:t> </a:t>
-            </a:r>
           </a:p>
           <a:p>
             <a:pPr lvl="1"/>
@@ -4491,7 +4483,7 @@
           <a:p>
             <a:fld id="{B34AA640-87DE-403B-AC78-F6FEE0B57B5D}" type="datetime1">
               <a:rPr lang="zh-CN" altLang="en-US" smtClean="0"/>
-              <a:t>2016/9/11</a:t>
+              <a:t>2016/9/17</a:t>
             </a:fld>
             <a:endParaRPr lang="zh-CN" altLang="en-US"/>
           </a:p>
@@ -4566,59 +4558,103 @@
           <a:lstStyle/>
           <a:p>
             <a:r>
+              <a:rPr lang="en-US" altLang="zh-CN" dirty="0" err="1"/>
+              <a:t>getExtension</a:t>
+            </a:r>
+            <a:endParaRPr lang="zh-CN" altLang="en-US" dirty="0"/>
+          </a:p>
+        </p:txBody>
+      </p:sp>
+      <p:sp>
+        <p:nvSpPr>
+          <p:cNvPr id="3" name="内容占位符 2"/>
+          <p:cNvSpPr>
+            <a:spLocks noGrp="1"/>
+          </p:cNvSpPr>
+          <p:nvPr>
+            <p:ph idx="1"/>
+          </p:nvPr>
+        </p:nvSpPr>
+        <p:spPr/>
+        <p:txBody>
+          <a:bodyPr/>
+          <a:lstStyle/>
+          <a:p>
+            <a:r>
+              <a:rPr lang="zh-CN" altLang="en-US" dirty="0"/>
+              <a:t>根</a:t>
+            </a:r>
+            <a:r>
               <a:rPr lang="zh-CN" altLang="en-US" dirty="0" smtClean="0"/>
-              <a:t>内部</a:t>
-            </a:r>
-            <a:endParaRPr lang="zh-CN" altLang="en-US" dirty="0"/>
-          </a:p>
-        </p:txBody>
-      </p:sp>
-      <p:sp>
-        <p:nvSpPr>
-          <p:cNvPr id="3" name="内容占位符 2"/>
-          <p:cNvSpPr>
-            <a:spLocks noGrp="1"/>
-          </p:cNvSpPr>
-          <p:nvPr>
-            <p:ph idx="1"/>
-          </p:nvPr>
-        </p:nvSpPr>
-        <p:spPr/>
-        <p:txBody>
-          <a:bodyPr/>
-          <a:lstStyle/>
-          <a:p>
-            <a:r>
-              <a:rPr lang="en-US" altLang="zh-CN" dirty="0" err="1" smtClean="0"/>
-              <a:t>createAdaptiveExtension</a:t>
+              <a:t>据参数</a:t>
+            </a:r>
+            <a:r>
+              <a:rPr lang="en-US" altLang="zh-CN" dirty="0" smtClean="0"/>
+              <a:t>name</a:t>
+            </a:r>
+            <a:r>
+              <a:rPr lang="zh-CN" altLang="en-US" dirty="0" smtClean="0"/>
+              <a:t>获取实现</a:t>
             </a:r>
             <a:endParaRPr lang="en-US" altLang="zh-CN" dirty="0" smtClean="0"/>
           </a:p>
           <a:p>
             <a:r>
-              <a:rPr lang="en-US" altLang="zh-CN" dirty="0" err="1" smtClean="0"/>
-              <a:t>getAdaptiveExtensionClass</a:t>
+              <a:rPr lang="en-US" altLang="zh-CN" dirty="0" smtClean="0"/>
+              <a:t>Name</a:t>
+            </a:r>
+            <a:r>
+              <a:rPr lang="zh-CN" altLang="en-US" dirty="0" smtClean="0"/>
+              <a:t>与实现的关系是配置在</a:t>
+            </a:r>
+            <a:r>
+              <a:rPr lang="en-US" altLang="zh-CN" dirty="0" smtClean="0"/>
+              <a:t>META-INF</a:t>
+            </a:r>
+            <a:r>
+              <a:rPr lang="zh-CN" altLang="en-US" dirty="0" smtClean="0"/>
+              <a:t>目录下以接口名命名的文件</a:t>
             </a:r>
             <a:endParaRPr lang="en-US" altLang="zh-CN" dirty="0" smtClean="0"/>
           </a:p>
           <a:p>
+            <a:r>
+              <a:rPr lang="en-US" altLang="zh-CN" dirty="0" smtClean="0"/>
+              <a:t>Name</a:t>
+            </a:r>
+            <a:r>
+              <a:rPr lang="zh-CN" altLang="en-US" dirty="0" smtClean="0"/>
+              <a:t>对应实例的创建是通过反射</a:t>
+            </a:r>
+            <a:endParaRPr lang="en-US" altLang="zh-CN" dirty="0" smtClean="0"/>
+          </a:p>
+          <a:p>
+            <a:r>
+              <a:rPr lang="zh-CN" altLang="en-US" dirty="0"/>
+              <a:t>实</a:t>
+            </a:r>
+            <a:r>
+              <a:rPr lang="zh-CN" altLang="en-US" dirty="0" smtClean="0"/>
+              <a:t>例是单例的</a:t>
+            </a:r>
+            <a:endParaRPr lang="en-US" altLang="zh-CN" dirty="0" smtClean="0"/>
+          </a:p>
+          <a:p>
+            <a:r>
+              <a:rPr lang="zh-CN" altLang="en-US" dirty="0"/>
+              <a:t>实</a:t>
+            </a:r>
+            <a:r>
+              <a:rPr lang="zh-CN" altLang="en-US" dirty="0" smtClean="0"/>
+              <a:t>例自身内部字段引用其他字段通过</a:t>
+            </a:r>
             <a:r>
               <a:rPr lang="en-US" altLang="zh-CN" dirty="0" err="1" smtClean="0"/>
               <a:t>injectExtension</a:t>
             </a:r>
-            <a:endParaRPr lang="en-US" altLang="zh-CN" dirty="0" smtClean="0"/>
-          </a:p>
-          <a:p>
-            <a:r>
-              <a:rPr lang="en-US" altLang="zh-CN" dirty="0" err="1" smtClean="0"/>
-              <a:t>getExtensionClasses</a:t>
-            </a:r>
-            <a:endParaRPr lang="en-US" altLang="zh-CN" dirty="0" smtClean="0"/>
-          </a:p>
-          <a:p>
-            <a:r>
-              <a:rPr lang="en-US" altLang="zh-CN" dirty="0" err="1"/>
-              <a:t>loadExtensionClasses</a:t>
+            <a:r>
+              <a:rPr lang="zh-CN" altLang="en-US" dirty="0" smtClean="0"/>
+              <a:t>方法实现注入</a:t>
             </a:r>
             <a:endParaRPr lang="zh-CN" altLang="en-US" dirty="0"/>
           </a:p>
@@ -4641,7 +4677,7 @@
           <a:p>
             <a:fld id="{B34AA640-87DE-403B-AC78-F6FEE0B57B5D}" type="datetime1">
               <a:rPr lang="zh-CN" altLang="en-US" smtClean="0"/>
-              <a:t>2016/9/11</a:t>
+              <a:t>2016/9/17</a:t>
             </a:fld>
             <a:endParaRPr lang="zh-CN" altLang="en-US"/>
           </a:p>
@@ -4673,7 +4709,7 @@
     </p:spTree>
     <p:extLst>
       <p:ext uri="{BB962C8B-B14F-4D97-AF65-F5344CB8AC3E}">
-        <p14:creationId xmlns:p14="http://schemas.microsoft.com/office/powerpoint/2010/main" val="3576618553"/>
+        <p14:creationId xmlns:p14="http://schemas.microsoft.com/office/powerpoint/2010/main" val="4081876188"/>
       </p:ext>
     </p:extLst>
   </p:cSld>
@@ -4716,8 +4752,12 @@
           <a:lstStyle/>
           <a:p>
             <a:r>
-              <a:rPr lang="en-US" altLang="zh-CN" dirty="0" err="1"/>
-              <a:t>ExtensionLoader</a:t>
+              <a:rPr lang="en-US" altLang="zh-CN" dirty="0" err="1" smtClean="0"/>
+              <a:t>getAdaptiveExtension</a:t>
+            </a:r>
+            <a:r>
+              <a:rPr lang="en-US" altLang="zh-CN" dirty="0" smtClean="0"/>
+              <a:t> 1</a:t>
             </a:r>
             <a:endParaRPr lang="zh-CN" altLang="en-US" dirty="0"/>
           </a:p>
@@ -4735,73 +4775,125 @@
         </p:nvSpPr>
         <p:spPr/>
         <p:txBody>
-          <a:bodyPr/>
-          <a:lstStyle/>
-          <a:p>
+          <a:bodyPr>
+            <a:normAutofit lnSpcReduction="10000"/>
+          </a:bodyPr>
+          <a:lstStyle/>
+          <a:p>
+            <a:r>
+              <a:rPr lang="zh-CN" altLang="en-US" dirty="0" smtClean="0"/>
+              <a:t>分两个级别： 类级别与方法级别</a:t>
+            </a:r>
+            <a:endParaRPr lang="en-US" altLang="zh-CN" dirty="0" smtClean="0"/>
+          </a:p>
+          <a:p>
+            <a:r>
+              <a:rPr lang="zh-CN" altLang="en-US" dirty="0" smtClean="0"/>
+              <a:t>对于类 </a:t>
+            </a:r>
+            <a:endParaRPr lang="en-US" altLang="zh-CN" dirty="0" smtClean="0"/>
+          </a:p>
+          <a:p>
+            <a:pPr lvl="1"/>
+            <a:r>
+              <a:rPr lang="zh-CN" altLang="en-US" dirty="0" smtClean="0"/>
+              <a:t>根据类级别的</a:t>
+            </a:r>
             <a:r>
               <a:rPr lang="en-US" altLang="zh-CN" dirty="0" smtClean="0"/>
-              <a:t>A</a:t>
-            </a:r>
-          </a:p>
-          <a:p>
-            <a:r>
-              <a:rPr lang="en-US" altLang="zh-CN" sz="2000" b="1" dirty="0">
-                <a:solidFill>
-                  <a:srgbClr val="7F0055"/>
-                </a:solidFill>
-                <a:highlight>
-                  <a:srgbClr val="E8F2FE"/>
-                </a:highlight>
-                <a:latin typeface="Consolas"/>
-              </a:rPr>
-              <a:t>public</a:t>
-            </a:r>
-            <a:r>
-              <a:rPr lang="en-US" altLang="zh-CN" sz="2000" b="1" dirty="0">
-                <a:solidFill>
-                  <a:srgbClr val="000000"/>
-                </a:solidFill>
-                <a:highlight>
-                  <a:srgbClr val="E8F2FE"/>
-                </a:highlight>
-                <a:latin typeface="Consolas"/>
-              </a:rPr>
-              <a:t> T </a:t>
-            </a:r>
-            <a:r>
-              <a:rPr lang="en-US" altLang="zh-CN" sz="2000" b="1" dirty="0" err="1">
-                <a:solidFill>
-                  <a:srgbClr val="000000"/>
-                </a:solidFill>
-                <a:highlight>
-                  <a:srgbClr val="D4D4D4"/>
-                </a:highlight>
-                <a:latin typeface="Consolas"/>
-              </a:rPr>
-              <a:t>getExtension</a:t>
-            </a:r>
-            <a:r>
-              <a:rPr lang="en-US" altLang="zh-CN" sz="2000" b="1" dirty="0">
-                <a:solidFill>
-                  <a:srgbClr val="000000"/>
-                </a:solidFill>
-                <a:highlight>
-                  <a:srgbClr val="E8F2FE"/>
-                </a:highlight>
-                <a:latin typeface="Consolas"/>
-              </a:rPr>
-              <a:t>(String name)</a:t>
-            </a:r>
-            <a:endParaRPr lang="en-US" altLang="zh-CN" sz="2000" dirty="0" smtClean="0"/>
-          </a:p>
-          <a:p>
+              <a:t>adaptive</a:t>
+            </a:r>
+            <a:r>
+              <a:rPr lang="zh-CN" altLang="en-US" dirty="0" smtClean="0"/>
+              <a:t>注解指定值作为</a:t>
+            </a:r>
             <a:r>
               <a:rPr lang="en-US" altLang="zh-CN" dirty="0" smtClean="0"/>
-              <a:t>A</a:t>
-            </a:r>
-          </a:p>
-          <a:p>
-            <a:endParaRPr lang="zh-CN" altLang="en-US" dirty="0"/>
+              <a:t>name</a:t>
+            </a:r>
+            <a:r>
+              <a:rPr lang="zh-CN" altLang="en-US" dirty="0" smtClean="0"/>
+              <a:t>去获取相应的实例</a:t>
+            </a:r>
+            <a:endParaRPr lang="en-US" altLang="zh-CN" dirty="0" smtClean="0"/>
+          </a:p>
+          <a:p>
+            <a:r>
+              <a:rPr lang="zh-CN" altLang="en-US" dirty="0" smtClean="0"/>
+              <a:t>对于方法 </a:t>
+            </a:r>
+            <a:endParaRPr lang="en-US" altLang="zh-CN" dirty="0" smtClean="0"/>
+          </a:p>
+          <a:p>
+            <a:pPr lvl="1"/>
+            <a:r>
+              <a:rPr lang="zh-CN" altLang="en-US" dirty="0" smtClean="0"/>
+              <a:t>根据方法级</a:t>
+            </a:r>
+            <a:r>
+              <a:rPr lang="zh-CN" altLang="en-US" dirty="0"/>
+              <a:t>别的</a:t>
+            </a:r>
+            <a:r>
+              <a:rPr lang="en-US" altLang="zh-CN" dirty="0" smtClean="0"/>
+              <a:t>adaptive</a:t>
+            </a:r>
+            <a:r>
+              <a:rPr lang="zh-CN" altLang="en-US" dirty="0"/>
+              <a:t>注解指定值作</a:t>
+            </a:r>
+            <a:r>
+              <a:rPr lang="zh-CN" altLang="en-US" dirty="0" smtClean="0"/>
+              <a:t>为键从</a:t>
+            </a:r>
+            <a:r>
+              <a:rPr lang="en-US" altLang="zh-CN" dirty="0" err="1" smtClean="0"/>
+              <a:t>url</a:t>
+            </a:r>
+            <a:r>
+              <a:rPr lang="zh-CN" altLang="en-US" dirty="0" smtClean="0"/>
+              <a:t>中获取键对应的值作为</a:t>
+            </a:r>
+            <a:r>
+              <a:rPr lang="en-US" altLang="zh-CN" dirty="0" smtClean="0"/>
+              <a:t>name</a:t>
+            </a:r>
+            <a:r>
+              <a:rPr lang="zh-CN" altLang="en-US" dirty="0" smtClean="0"/>
+              <a:t>，然后再用</a:t>
+            </a:r>
+            <a:r>
+              <a:rPr lang="en-US" altLang="zh-CN" dirty="0" smtClean="0"/>
+              <a:t>name</a:t>
+            </a:r>
+            <a:r>
+              <a:rPr lang="zh-CN" altLang="en-US" dirty="0" smtClean="0"/>
+              <a:t>去</a:t>
+            </a:r>
+            <a:r>
+              <a:rPr lang="zh-CN" altLang="en-US" dirty="0"/>
+              <a:t>获取相应的实</a:t>
+            </a:r>
+            <a:r>
+              <a:rPr lang="zh-CN" altLang="en-US" dirty="0" smtClean="0"/>
+              <a:t>例</a:t>
+            </a:r>
+            <a:endParaRPr lang="en-US" altLang="zh-CN" dirty="0" smtClean="0"/>
+          </a:p>
+          <a:p>
+            <a:r>
+              <a:rPr lang="en-US" altLang="zh-CN" dirty="0"/>
+              <a:t>Name</a:t>
+            </a:r>
+            <a:r>
+              <a:rPr lang="zh-CN" altLang="en-US" dirty="0"/>
+              <a:t>与实现的关系同于</a:t>
+            </a:r>
+            <a:r>
+              <a:rPr lang="en-US" altLang="zh-CN" dirty="0" smtClean="0"/>
+              <a:t>extension</a:t>
+            </a:r>
+            <a:endParaRPr lang="en-US" altLang="zh-CN" dirty="0"/>
           </a:p>
         </p:txBody>
       </p:sp>
@@ -4822,7 +4914,7 @@
           <a:p>
             <a:fld id="{B34AA640-87DE-403B-AC78-F6FEE0B57B5D}" type="datetime1">
               <a:rPr lang="zh-CN" altLang="en-US" smtClean="0"/>
-              <a:t>2016/9/11</a:t>
+              <a:t>2016/9/17</a:t>
             </a:fld>
             <a:endParaRPr lang="zh-CN" altLang="en-US"/>
           </a:p>
@@ -4854,13 +4946,754 @@
     </p:spTree>
     <p:extLst>
       <p:ext uri="{BB962C8B-B14F-4D97-AF65-F5344CB8AC3E}">
-        <p14:creationId xmlns:p14="http://schemas.microsoft.com/office/powerpoint/2010/main" val="486378179"/>
+        <p14:creationId xmlns:p14="http://schemas.microsoft.com/office/powerpoint/2010/main" val="3475256874"/>
       </p:ext>
     </p:extLst>
   </p:cSld>
   <p:clrMapOvr>
     <a:masterClrMapping/>
   </p:clrMapOvr>
+  <p:timing>
+    <p:tnLst>
+      <p:par>
+        <p:cTn id="1" dur="indefinite" restart="never" nodeType="tmRoot"/>
+      </p:par>
+    </p:tnLst>
+  </p:timing>
+</p:sld>
+</file>
+
+<file path=ppt/slides/slide7.xml><?xml version="1.0" encoding="utf-8"?>
+<p:sld xmlns:a="http://schemas.openxmlformats.org/drawingml/2006/main" xmlns:r="http://schemas.openxmlformats.org/officeDocument/2006/relationships" xmlns:p="http://schemas.openxmlformats.org/presentationml/2006/main">
+  <p:cSld>
+    <p:spTree>
+      <p:nvGrpSpPr>
+        <p:cNvPr id="1" name=""/>
+        <p:cNvGrpSpPr/>
+        <p:nvPr/>
+      </p:nvGrpSpPr>
+      <p:grpSpPr>
+        <a:xfrm>
+          <a:off x="0" y="0"/>
+          <a:ext cx="0" cy="0"/>
+          <a:chOff x="0" y="0"/>
+          <a:chExt cx="0" cy="0"/>
+        </a:xfrm>
+      </p:grpSpPr>
+      <p:sp>
+        <p:nvSpPr>
+          <p:cNvPr id="2" name="标题 1"/>
+          <p:cNvSpPr>
+            <a:spLocks noGrp="1"/>
+          </p:cNvSpPr>
+          <p:nvPr>
+            <p:ph type="title"/>
+          </p:nvPr>
+        </p:nvSpPr>
+        <p:spPr/>
+        <p:txBody>
+          <a:bodyPr/>
+          <a:lstStyle/>
+          <a:p>
+            <a:r>
+              <a:rPr lang="en-US" altLang="zh-CN" dirty="0" err="1" smtClean="0"/>
+              <a:t>getAdaptiveExtension</a:t>
+            </a:r>
+            <a:r>
+              <a:rPr lang="en-US" altLang="zh-CN" dirty="0" smtClean="0"/>
+              <a:t> 2</a:t>
+            </a:r>
+            <a:endParaRPr lang="zh-CN" altLang="en-US" dirty="0"/>
+          </a:p>
+        </p:txBody>
+      </p:sp>
+      <p:sp>
+        <p:nvSpPr>
+          <p:cNvPr id="3" name="内容占位符 2"/>
+          <p:cNvSpPr>
+            <a:spLocks noGrp="1"/>
+          </p:cNvSpPr>
+          <p:nvPr>
+            <p:ph idx="1"/>
+          </p:nvPr>
+        </p:nvSpPr>
+        <p:spPr/>
+        <p:txBody>
+          <a:bodyPr>
+            <a:normAutofit fontScale="92500" lnSpcReduction="10000"/>
+          </a:bodyPr>
+          <a:lstStyle/>
+          <a:p>
+            <a:r>
+              <a:rPr lang="zh-CN" altLang="en-US" dirty="0"/>
+              <a:t>对于方</a:t>
+            </a:r>
+            <a:r>
+              <a:rPr lang="zh-CN" altLang="en-US" dirty="0" smtClean="0"/>
+              <a:t>法级 获取</a:t>
+            </a:r>
+            <a:r>
+              <a:rPr lang="en-US" altLang="zh-CN" dirty="0" err="1"/>
+              <a:t>getAdaptiveExtension</a:t>
+            </a:r>
+            <a:r>
+              <a:rPr lang="zh-CN" altLang="en-US" dirty="0" smtClean="0"/>
+              <a:t>过程通过动态生成代码的方式实现 </a:t>
+            </a:r>
+            <a:endParaRPr lang="en-US" altLang="zh-CN" dirty="0" smtClean="0"/>
+          </a:p>
+          <a:p>
+            <a:r>
+              <a:rPr lang="zh-CN" altLang="en-US" dirty="0"/>
+              <a:t>当</a:t>
+            </a:r>
+            <a:r>
+              <a:rPr lang="zh-CN" altLang="en-US" dirty="0" smtClean="0"/>
+              <a:t>然将这个动态生成的代码硬编码在代码中，通过</a:t>
+            </a:r>
+            <a:r>
+              <a:rPr lang="en-US" altLang="zh-CN" dirty="0" err="1" smtClean="0"/>
+              <a:t>getExtension</a:t>
+            </a:r>
+            <a:r>
+              <a:rPr lang="zh-CN" altLang="en-US" dirty="0" smtClean="0"/>
+              <a:t>获取的作用也是等价的</a:t>
+            </a:r>
+            <a:endParaRPr lang="en-US" altLang="zh-CN" dirty="0" smtClean="0"/>
+          </a:p>
+          <a:p>
+            <a:r>
+              <a:rPr lang="zh-CN" altLang="en-US" dirty="0"/>
+              <a:t>参</a:t>
+            </a:r>
+            <a:r>
+              <a:rPr lang="zh-CN" altLang="en-US" dirty="0" smtClean="0"/>
+              <a:t>见</a:t>
+            </a:r>
+            <a:r>
+              <a:rPr lang="en-US" altLang="zh-CN" dirty="0" err="1" smtClean="0"/>
+              <a:t>AbstractClusterInvoker</a:t>
+            </a:r>
+            <a:r>
+              <a:rPr lang="en-US" altLang="zh-CN" dirty="0" smtClean="0"/>
+              <a:t> line220</a:t>
+            </a:r>
+          </a:p>
+          <a:p>
+            <a:r>
+              <a:rPr lang="en-US" altLang="zh-CN" sz="2400" dirty="0" err="1">
+                <a:solidFill>
+                  <a:srgbClr val="000000"/>
+                </a:solidFill>
+                <a:highlight>
+                  <a:srgbClr val="C6DBAE"/>
+                </a:highlight>
+                <a:latin typeface="Consolas"/>
+              </a:rPr>
+              <a:t>loadbalance</a:t>
+            </a:r>
+            <a:r>
+              <a:rPr lang="en-US" altLang="zh-CN" sz="2400" dirty="0">
+                <a:solidFill>
+                  <a:srgbClr val="000000"/>
+                </a:solidFill>
+                <a:highlight>
+                  <a:srgbClr val="C6DBAE"/>
+                </a:highlight>
+                <a:latin typeface="Consolas"/>
+              </a:rPr>
+              <a:t> = </a:t>
+            </a:r>
+            <a:r>
+              <a:rPr lang="en-US" altLang="zh-CN" sz="2400" dirty="0" err="1">
+                <a:solidFill>
+                  <a:srgbClr val="000000"/>
+                </a:solidFill>
+                <a:highlight>
+                  <a:srgbClr val="C6DBAE"/>
+                </a:highlight>
+                <a:latin typeface="Consolas"/>
+              </a:rPr>
+              <a:t>ExtensionLoader.</a:t>
+            </a:r>
+            <a:r>
+              <a:rPr lang="en-US" altLang="zh-CN" sz="2400" i="1" dirty="0" err="1">
+                <a:solidFill>
+                  <a:srgbClr val="000000"/>
+                </a:solidFill>
+                <a:highlight>
+                  <a:srgbClr val="C6DBAE"/>
+                </a:highlight>
+                <a:latin typeface="Consolas"/>
+              </a:rPr>
+              <a:t>getExtensionLoader</a:t>
+            </a:r>
+            <a:r>
+              <a:rPr lang="en-US" altLang="zh-CN" sz="2400" i="1" dirty="0">
+                <a:solidFill>
+                  <a:srgbClr val="000000"/>
+                </a:solidFill>
+                <a:highlight>
+                  <a:srgbClr val="C6DBAE"/>
+                </a:highlight>
+                <a:latin typeface="Consolas"/>
+              </a:rPr>
+              <a:t>(</a:t>
+            </a:r>
+            <a:r>
+              <a:rPr lang="en-US" altLang="zh-CN" sz="2400" i="1" dirty="0" err="1">
+                <a:solidFill>
+                  <a:srgbClr val="000000"/>
+                </a:solidFill>
+                <a:highlight>
+                  <a:srgbClr val="C6DBAE"/>
+                </a:highlight>
+                <a:latin typeface="Consolas"/>
+              </a:rPr>
+              <a:t>LoadBalance.</a:t>
+            </a:r>
+            <a:r>
+              <a:rPr lang="en-US" altLang="zh-CN" sz="2400" b="1" i="1" dirty="0" err="1">
+                <a:solidFill>
+                  <a:srgbClr val="7F0055"/>
+                </a:solidFill>
+                <a:highlight>
+                  <a:srgbClr val="C6DBAE"/>
+                </a:highlight>
+                <a:latin typeface="Consolas"/>
+              </a:rPr>
+              <a:t>class</a:t>
+            </a:r>
+            <a:r>
+              <a:rPr lang="en-US" altLang="zh-CN" sz="2400" b="1" i="1" dirty="0">
+                <a:solidFill>
+                  <a:srgbClr val="000000"/>
+                </a:solidFill>
+                <a:highlight>
+                  <a:srgbClr val="C6DBAE"/>
+                </a:highlight>
+                <a:latin typeface="Consolas"/>
+              </a:rPr>
+              <a:t>).</a:t>
+            </a:r>
+            <a:r>
+              <a:rPr lang="en-US" altLang="zh-CN" sz="2400" b="1" i="1" dirty="0" err="1">
+                <a:solidFill>
+                  <a:srgbClr val="000000"/>
+                </a:solidFill>
+                <a:highlight>
+                  <a:srgbClr val="C6DBAE"/>
+                </a:highlight>
+                <a:latin typeface="Consolas"/>
+              </a:rPr>
+              <a:t>getExtension</a:t>
+            </a:r>
+            <a:r>
+              <a:rPr lang="en-US" altLang="zh-CN" sz="2400" b="1" i="1" dirty="0">
+                <a:solidFill>
+                  <a:srgbClr val="000000"/>
+                </a:solidFill>
+                <a:highlight>
+                  <a:srgbClr val="C6DBAE"/>
+                </a:highlight>
+                <a:latin typeface="Consolas"/>
+              </a:rPr>
+              <a:t>(</a:t>
+            </a:r>
+            <a:r>
+              <a:rPr lang="en-US" altLang="zh-CN" sz="2400" b="1" i="1" dirty="0" err="1">
+                <a:solidFill>
+                  <a:srgbClr val="000000"/>
+                </a:solidFill>
+                <a:highlight>
+                  <a:srgbClr val="C6DBAE"/>
+                </a:highlight>
+                <a:latin typeface="Consolas"/>
+              </a:rPr>
+              <a:t>invokers.get</a:t>
+            </a:r>
+            <a:r>
+              <a:rPr lang="en-US" altLang="zh-CN" sz="2400" b="1" i="1" dirty="0">
+                <a:solidFill>
+                  <a:srgbClr val="000000"/>
+                </a:solidFill>
+                <a:highlight>
+                  <a:srgbClr val="C6DBAE"/>
+                </a:highlight>
+                <a:latin typeface="Consolas"/>
+              </a:rPr>
+              <a:t>(0).</a:t>
+            </a:r>
+            <a:r>
+              <a:rPr lang="en-US" altLang="zh-CN" sz="2400" b="1" i="1" dirty="0" err="1">
+                <a:solidFill>
+                  <a:srgbClr val="000000"/>
+                </a:solidFill>
+                <a:highlight>
+                  <a:srgbClr val="C6DBAE"/>
+                </a:highlight>
+                <a:latin typeface="Consolas"/>
+              </a:rPr>
+              <a:t>getUrl</a:t>
+            </a:r>
+            <a:r>
+              <a:rPr lang="en-US" altLang="zh-CN" sz="2400" b="1" i="1" dirty="0">
+                <a:solidFill>
+                  <a:srgbClr val="000000"/>
+                </a:solidFill>
+                <a:highlight>
+                  <a:srgbClr val="C6DBAE"/>
+                </a:highlight>
+                <a:latin typeface="Consolas"/>
+              </a:rPr>
+              <a:t>()</a:t>
+            </a:r>
+          </a:p>
+          <a:p>
+            <a:r>
+              <a:rPr lang="en-US" altLang="zh-CN" sz="2400" dirty="0">
+                <a:solidFill>
+                  <a:srgbClr val="000000"/>
+                </a:solidFill>
+                <a:latin typeface="Consolas"/>
+              </a:rPr>
+              <a:t>                    .</a:t>
+            </a:r>
+            <a:r>
+              <a:rPr lang="en-US" altLang="zh-CN" sz="2400" dirty="0" err="1">
+                <a:solidFill>
+                  <a:srgbClr val="000000"/>
+                </a:solidFill>
+                <a:latin typeface="Consolas"/>
+              </a:rPr>
+              <a:t>getMethodParameter</a:t>
+            </a:r>
+            <a:r>
+              <a:rPr lang="en-US" altLang="zh-CN" sz="2400" dirty="0">
+                <a:solidFill>
+                  <a:srgbClr val="000000"/>
+                </a:solidFill>
+                <a:latin typeface="Consolas"/>
+              </a:rPr>
+              <a:t>(</a:t>
+            </a:r>
+            <a:r>
+              <a:rPr lang="en-US" altLang="zh-CN" sz="2400" dirty="0" err="1">
+                <a:solidFill>
+                  <a:srgbClr val="000000"/>
+                </a:solidFill>
+                <a:latin typeface="Consolas"/>
+              </a:rPr>
+              <a:t>invocation.getMethodName</a:t>
+            </a:r>
+            <a:r>
+              <a:rPr lang="en-US" altLang="zh-CN" sz="2400" dirty="0">
+                <a:solidFill>
+                  <a:srgbClr val="000000"/>
+                </a:solidFill>
+                <a:latin typeface="Consolas"/>
+              </a:rPr>
+              <a:t>(),</a:t>
+            </a:r>
+            <a:r>
+              <a:rPr lang="en-US" altLang="zh-CN" sz="2400" dirty="0" err="1">
+                <a:solidFill>
+                  <a:srgbClr val="000000"/>
+                </a:solidFill>
+                <a:latin typeface="Consolas"/>
+              </a:rPr>
+              <a:t>Constants.</a:t>
+            </a:r>
+            <a:r>
+              <a:rPr lang="en-US" altLang="zh-CN" sz="2400" i="1" dirty="0" err="1">
+                <a:solidFill>
+                  <a:srgbClr val="0000C0"/>
+                </a:solidFill>
+                <a:latin typeface="Consolas"/>
+              </a:rPr>
+              <a:t>LOADBALANCE_KEY</a:t>
+            </a:r>
+            <a:r>
+              <a:rPr lang="en-US" altLang="zh-CN" sz="2400" i="1" dirty="0">
+                <a:solidFill>
+                  <a:srgbClr val="000000"/>
+                </a:solidFill>
+                <a:latin typeface="Consolas"/>
+              </a:rPr>
+              <a:t>, </a:t>
+            </a:r>
+            <a:r>
+              <a:rPr lang="en-US" altLang="zh-CN" sz="2400" i="1" dirty="0" err="1">
+                <a:solidFill>
+                  <a:srgbClr val="000000"/>
+                </a:solidFill>
+                <a:latin typeface="Consolas"/>
+              </a:rPr>
+              <a:t>Constants.</a:t>
+            </a:r>
+            <a:r>
+              <a:rPr lang="en-US" altLang="zh-CN" sz="2400" i="1" dirty="0" err="1">
+                <a:solidFill>
+                  <a:srgbClr val="0000C0"/>
+                </a:solidFill>
+                <a:latin typeface="Consolas"/>
+              </a:rPr>
+              <a:t>DEFAULT_LOADBALANCE</a:t>
+            </a:r>
+            <a:r>
+              <a:rPr lang="en-US" altLang="zh-CN" sz="2400" i="1" dirty="0">
+                <a:solidFill>
+                  <a:srgbClr val="000000"/>
+                </a:solidFill>
+                <a:latin typeface="Consolas"/>
+              </a:rPr>
+              <a:t>));</a:t>
+            </a:r>
+            <a:endParaRPr lang="en-US" altLang="zh-CN" sz="2100" dirty="0"/>
+          </a:p>
+        </p:txBody>
+      </p:sp>
+      <p:sp>
+        <p:nvSpPr>
+          <p:cNvPr id="4" name="日期占位符 3"/>
+          <p:cNvSpPr>
+            <a:spLocks noGrp="1"/>
+          </p:cNvSpPr>
+          <p:nvPr>
+            <p:ph type="dt" sz="half" idx="10"/>
+          </p:nvPr>
+        </p:nvSpPr>
+        <p:spPr/>
+        <p:txBody>
+          <a:bodyPr/>
+          <a:lstStyle/>
+          <a:p>
+            <a:fld id="{B34AA640-87DE-403B-AC78-F6FEE0B57B5D}" type="datetime1">
+              <a:rPr lang="zh-CN" altLang="en-US" smtClean="0"/>
+              <a:t>2016/9/17</a:t>
+            </a:fld>
+            <a:endParaRPr lang="zh-CN" altLang="en-US"/>
+          </a:p>
+        </p:txBody>
+      </p:sp>
+      <p:sp>
+        <p:nvSpPr>
+          <p:cNvPr id="5" name="灯片编号占位符 4"/>
+          <p:cNvSpPr>
+            <a:spLocks noGrp="1"/>
+          </p:cNvSpPr>
+          <p:nvPr>
+            <p:ph type="sldNum" sz="quarter" idx="12"/>
+          </p:nvPr>
+        </p:nvSpPr>
+        <p:spPr/>
+        <p:txBody>
+          <a:bodyPr/>
+          <a:lstStyle/>
+          <a:p>
+            <a:fld id="{0C913308-F349-4B6D-A68A-DD1791B4A57B}" type="slidenum">
+              <a:rPr lang="zh-CN" altLang="en-US" smtClean="0"/>
+              <a:t>7</a:t>
+            </a:fld>
+            <a:endParaRPr lang="zh-CN" altLang="en-US"/>
+          </a:p>
+        </p:txBody>
+      </p:sp>
+      <p:graphicFrame>
+        <p:nvGraphicFramePr>
+          <p:cNvPr id="6" name="对象 5"/>
+          <p:cNvGraphicFramePr>
+            <a:graphicFrameLocks noChangeAspect="1"/>
+          </p:cNvGraphicFramePr>
+          <p:nvPr>
+            <p:extLst>
+              <p:ext uri="{D42A27DB-BD31-4B8C-83A1-F6EECF244321}">
+                <p14:modId xmlns:p14="http://schemas.microsoft.com/office/powerpoint/2010/main" val="3348249430"/>
+              </p:ext>
+            </p:extLst>
+          </p:nvPr>
+        </p:nvGraphicFramePr>
+        <p:xfrm>
+          <a:off x="5796136" y="1916832"/>
+          <a:ext cx="2413000" cy="711200"/>
+        </p:xfrm>
+        <a:graphic>
+          <a:graphicData uri="http://schemas.openxmlformats.org/presentationml/2006/ole">
+            <mc:AlternateContent xmlns:mc="http://schemas.openxmlformats.org/markup-compatibility/2006">
+              <mc:Choice xmlns:v="urn:schemas-microsoft-com:vml" Requires="v">
+                <p:oleObj spid="_x0000_s1032" name="包装程序外壳对象" showAsIcon="1" r:id="rId3" imgW="2413440" imgH="711360" progId="Package">
+                  <p:embed/>
+                </p:oleObj>
+              </mc:Choice>
+              <mc:Fallback>
+                <p:oleObj name="包装程序外壳对象" showAsIcon="1" r:id="rId3" imgW="2413440" imgH="711360" progId="Package">
+                  <p:embed/>
+                  <p:pic>
+                    <p:nvPicPr>
+                      <p:cNvPr id="0" name=""/>
+                      <p:cNvPicPr/>
+                      <p:nvPr/>
+                    </p:nvPicPr>
+                    <p:blipFill>
+                      <a:blip r:embed="rId4"/>
+                      <a:stretch>
+                        <a:fillRect/>
+                      </a:stretch>
+                    </p:blipFill>
+                    <p:spPr>
+                      <a:xfrm>
+                        <a:off x="5796136" y="1916832"/>
+                        <a:ext cx="2413000" cy="711200"/>
+                      </a:xfrm>
+                      <a:prstGeom prst="rect">
+                        <a:avLst/>
+                      </a:prstGeom>
+                    </p:spPr>
+                  </p:pic>
+                </p:oleObj>
+              </mc:Fallback>
+            </mc:AlternateContent>
+          </a:graphicData>
+        </a:graphic>
+      </p:graphicFrame>
+    </p:spTree>
+    <p:extLst>
+      <p:ext uri="{BB962C8B-B14F-4D97-AF65-F5344CB8AC3E}">
+        <p14:creationId xmlns:p14="http://schemas.microsoft.com/office/powerpoint/2010/main" val="2702209825"/>
+      </p:ext>
+    </p:extLst>
+  </p:cSld>
+  <p:clrMapOvr>
+    <a:masterClrMapping/>
+  </p:clrMapOvr>
+  <p:timing>
+    <p:tnLst>
+      <p:par>
+        <p:cTn id="1" dur="indefinite" restart="never" nodeType="tmRoot"/>
+      </p:par>
+    </p:tnLst>
+  </p:timing>
+</p:sld>
+</file>
+
+<file path=ppt/slides/slide8.xml><?xml version="1.0" encoding="utf-8"?>
+<p:sld xmlns:a="http://schemas.openxmlformats.org/drawingml/2006/main" xmlns:r="http://schemas.openxmlformats.org/officeDocument/2006/relationships" xmlns:p="http://schemas.openxmlformats.org/presentationml/2006/main">
+  <p:cSld>
+    <p:spTree>
+      <p:nvGrpSpPr>
+        <p:cNvPr id="1" name=""/>
+        <p:cNvGrpSpPr/>
+        <p:nvPr/>
+      </p:nvGrpSpPr>
+      <p:grpSpPr>
+        <a:xfrm>
+          <a:off x="0" y="0"/>
+          <a:ext cx="0" cy="0"/>
+          <a:chOff x="0" y="0"/>
+          <a:chExt cx="0" cy="0"/>
+        </a:xfrm>
+      </p:grpSpPr>
+      <p:sp>
+        <p:nvSpPr>
+          <p:cNvPr id="2" name="标题 1"/>
+          <p:cNvSpPr>
+            <a:spLocks noGrp="1"/>
+          </p:cNvSpPr>
+          <p:nvPr>
+            <p:ph type="title"/>
+          </p:nvPr>
+        </p:nvSpPr>
+        <p:spPr/>
+        <p:txBody>
+          <a:bodyPr/>
+          <a:lstStyle/>
+          <a:p>
+            <a:r>
+              <a:rPr lang="zh-CN" altLang="en-US" dirty="0" smtClean="0"/>
+              <a:t>内部</a:t>
+            </a:r>
+            <a:endParaRPr lang="zh-CN" altLang="en-US" dirty="0"/>
+          </a:p>
+        </p:txBody>
+      </p:sp>
+      <p:sp>
+        <p:nvSpPr>
+          <p:cNvPr id="3" name="内容占位符 2"/>
+          <p:cNvSpPr>
+            <a:spLocks noGrp="1"/>
+          </p:cNvSpPr>
+          <p:nvPr>
+            <p:ph idx="1"/>
+          </p:nvPr>
+        </p:nvSpPr>
+        <p:spPr/>
+        <p:txBody>
+          <a:bodyPr/>
+          <a:lstStyle/>
+          <a:p>
+            <a:r>
+              <a:rPr lang="en-US" altLang="zh-CN" dirty="0" err="1" smtClean="0"/>
+              <a:t>createAdaptiveExtension</a:t>
+            </a:r>
+            <a:endParaRPr lang="en-US" altLang="zh-CN" dirty="0" smtClean="0"/>
+          </a:p>
+          <a:p>
+            <a:r>
+              <a:rPr lang="en-US" altLang="zh-CN" dirty="0" err="1" smtClean="0"/>
+              <a:t>getAdaptiveExtensionClass</a:t>
+            </a:r>
+            <a:endParaRPr lang="en-US" altLang="zh-CN" dirty="0" smtClean="0"/>
+          </a:p>
+          <a:p>
+            <a:r>
+              <a:rPr lang="en-US" altLang="zh-CN" dirty="0" err="1" smtClean="0"/>
+              <a:t>injectExtension</a:t>
+            </a:r>
+            <a:endParaRPr lang="en-US" altLang="zh-CN" dirty="0" smtClean="0"/>
+          </a:p>
+          <a:p>
+            <a:r>
+              <a:rPr lang="en-US" altLang="zh-CN" dirty="0" err="1" smtClean="0"/>
+              <a:t>getExtensionClasses</a:t>
+            </a:r>
+            <a:endParaRPr lang="en-US" altLang="zh-CN" dirty="0" smtClean="0"/>
+          </a:p>
+          <a:p>
+            <a:r>
+              <a:rPr lang="en-US" altLang="zh-CN" dirty="0" err="1" smtClean="0"/>
+              <a:t>loadExtensionClasses</a:t>
+            </a:r>
+            <a:endParaRPr lang="en-US" altLang="zh-CN" dirty="0" smtClean="0"/>
+          </a:p>
+          <a:p>
+            <a:r>
+              <a:rPr lang="zh-CN" altLang="en-US" dirty="0" smtClean="0"/>
+              <a:t>详细分析 参见 </a:t>
+            </a:r>
+            <a:endParaRPr lang="zh-CN" altLang="en-US" dirty="0"/>
+          </a:p>
+        </p:txBody>
+      </p:sp>
+      <p:sp>
+        <p:nvSpPr>
+          <p:cNvPr id="4" name="日期占位符 3"/>
+          <p:cNvSpPr>
+            <a:spLocks noGrp="1"/>
+          </p:cNvSpPr>
+          <p:nvPr>
+            <p:ph type="dt" sz="half" idx="10"/>
+          </p:nvPr>
+        </p:nvSpPr>
+        <p:spPr/>
+        <p:txBody>
+          <a:bodyPr/>
+          <a:lstStyle/>
+          <a:p>
+            <a:fld id="{B34AA640-87DE-403B-AC78-F6FEE0B57B5D}" type="datetime1">
+              <a:rPr lang="zh-CN" altLang="en-US" smtClean="0"/>
+              <a:t>2016/9/17</a:t>
+            </a:fld>
+            <a:endParaRPr lang="zh-CN" altLang="en-US"/>
+          </a:p>
+        </p:txBody>
+      </p:sp>
+      <p:sp>
+        <p:nvSpPr>
+          <p:cNvPr id="5" name="灯片编号占位符 4"/>
+          <p:cNvSpPr>
+            <a:spLocks noGrp="1"/>
+          </p:cNvSpPr>
+          <p:nvPr>
+            <p:ph type="sldNum" sz="quarter" idx="12"/>
+          </p:nvPr>
+        </p:nvSpPr>
+        <p:spPr/>
+        <p:txBody>
+          <a:bodyPr/>
+          <a:lstStyle/>
+          <a:p>
+            <a:fld id="{0C913308-F349-4B6D-A68A-DD1791B4A57B}" type="slidenum">
+              <a:rPr lang="zh-CN" altLang="en-US" smtClean="0"/>
+              <a:t>8</a:t>
+            </a:fld>
+            <a:endParaRPr lang="zh-CN" altLang="en-US"/>
+          </a:p>
+        </p:txBody>
+      </p:sp>
+      <p:graphicFrame>
+        <p:nvGraphicFramePr>
+          <p:cNvPr id="6" name="对象 5"/>
+          <p:cNvGraphicFramePr>
+            <a:graphicFrameLocks noChangeAspect="1"/>
+          </p:cNvGraphicFramePr>
+          <p:nvPr>
+            <p:extLst>
+              <p:ext uri="{D42A27DB-BD31-4B8C-83A1-F6EECF244321}">
+                <p14:modId xmlns:p14="http://schemas.microsoft.com/office/powerpoint/2010/main" val="1451669253"/>
+              </p:ext>
+            </p:extLst>
+          </p:nvPr>
+        </p:nvGraphicFramePr>
+        <p:xfrm>
+          <a:off x="2771800" y="4653136"/>
+          <a:ext cx="3600400" cy="916465"/>
+        </p:xfrm>
+        <a:graphic>
+          <a:graphicData uri="http://schemas.openxmlformats.org/presentationml/2006/ole">
+            <mc:AlternateContent xmlns:mc="http://schemas.openxmlformats.org/markup-compatibility/2006">
+              <mc:Choice xmlns:v="urn:schemas-microsoft-com:vml" Requires="v">
+                <p:oleObj spid="_x0000_s2054" name="包装程序外壳对象" showAsIcon="1" r:id="rId3" imgW="2756520" imgH="711360" progId="Package">
+                  <p:embed/>
+                </p:oleObj>
+              </mc:Choice>
+              <mc:Fallback>
+                <p:oleObj name="包装程序外壳对象" showAsIcon="1" r:id="rId3" imgW="2756520" imgH="711360" progId="Package">
+                  <p:embed/>
+                  <p:pic>
+                    <p:nvPicPr>
+                      <p:cNvPr id="0" name=""/>
+                      <p:cNvPicPr/>
+                      <p:nvPr/>
+                    </p:nvPicPr>
+                    <p:blipFill>
+                      <a:blip r:embed="rId4"/>
+                      <a:stretch>
+                        <a:fillRect/>
+                      </a:stretch>
+                    </p:blipFill>
+                    <p:spPr>
+                      <a:xfrm>
+                        <a:off x="2771800" y="4653136"/>
+                        <a:ext cx="3600400" cy="916465"/>
+                      </a:xfrm>
+                      <a:prstGeom prst="rect">
+                        <a:avLst/>
+                      </a:prstGeom>
+                    </p:spPr>
+                  </p:pic>
+                </p:oleObj>
+              </mc:Fallback>
+            </mc:AlternateContent>
+          </a:graphicData>
+        </a:graphic>
+      </p:graphicFrame>
+    </p:spTree>
+    <p:extLst>
+      <p:ext uri="{BB962C8B-B14F-4D97-AF65-F5344CB8AC3E}">
+        <p14:creationId xmlns:p14="http://schemas.microsoft.com/office/powerpoint/2010/main" val="3576618553"/>
+      </p:ext>
+    </p:extLst>
+  </p:cSld>
+  <p:clrMapOvr>
+    <a:masterClrMapping/>
+  </p:clrMapOvr>
+  <p:timing>
+    <p:tnLst>
+      <p:par>
+        <p:cTn id="1" dur="indefinite" restart="never" nodeType="tmRoot"/>
+      </p:par>
+    </p:tnLst>
+  </p:timing>
 </p:sld>
 </file>
 

</xml_diff>